<commit_message>
Deploy website Tue Nov  8 13:04:13 PST 2022
</commit_message>
<xml_diff>
--- a/assets/slides/fa22/22-Iterators_and_Generators.pptx
+++ b/assets/slides/fa22/22-Iterators_and_Generators.pptx
@@ -5,74 +5,82 @@
     <p:sldMasterId id="2147483671" r:id="rId1"/>
   </p:sldMasterIdLst>
   <p:notesMasterIdLst>
-    <p:notesMasterId r:id="rId16"/>
+    <p:notesMasterId r:id="rId17"/>
   </p:notesMasterIdLst>
   <p:sldIdLst>
     <p:sldId id="360" r:id="rId2"/>
-    <p:sldId id="259" r:id="rId3"/>
-    <p:sldId id="261" r:id="rId4"/>
-    <p:sldId id="406" r:id="rId5"/>
-    <p:sldId id="268" r:id="rId6"/>
-    <p:sldId id="269" r:id="rId7"/>
-    <p:sldId id="407" r:id="rId8"/>
-    <p:sldId id="271" r:id="rId9"/>
-    <p:sldId id="272" r:id="rId10"/>
-    <p:sldId id="405" r:id="rId11"/>
-    <p:sldId id="273" r:id="rId12"/>
-    <p:sldId id="274" r:id="rId13"/>
-    <p:sldId id="275" r:id="rId14"/>
-    <p:sldId id="276" r:id="rId15"/>
+    <p:sldId id="408" r:id="rId3"/>
+    <p:sldId id="259" r:id="rId4"/>
+    <p:sldId id="261" r:id="rId5"/>
+    <p:sldId id="406" r:id="rId6"/>
+    <p:sldId id="268" r:id="rId7"/>
+    <p:sldId id="269" r:id="rId8"/>
+    <p:sldId id="407" r:id="rId9"/>
+    <p:sldId id="271" r:id="rId10"/>
+    <p:sldId id="272" r:id="rId11"/>
+    <p:sldId id="405" r:id="rId12"/>
+    <p:sldId id="273" r:id="rId13"/>
+    <p:sldId id="274" r:id="rId14"/>
+    <p:sldId id="275" r:id="rId15"/>
+    <p:sldId id="276" r:id="rId16"/>
   </p:sldIdLst>
   <p:sldSz cx="12192000" cy="6858000"/>
   <p:notesSz cx="6997700" cy="9194800"/>
   <p:embeddedFontLst>
     <p:embeddedFont>
+      <p:font typeface="Courier" panose="02070309020205020404" pitchFamily="49" charset="0"/>
+      <p:regular r:id="rId18"/>
+      <p:bold r:id="rId19"/>
+      <p:italic r:id="rId20"/>
+      <p:boldItalic r:id="rId21"/>
+    </p:embeddedFont>
+    <p:embeddedFont>
       <p:font typeface="FreightMicro Pro Bold" panose="02000603020000020004" pitchFamily="2" charset="0"/>
-      <p:bold r:id="rId17"/>
-      <p:italic r:id="rId18"/>
-      <p:boldItalic r:id="rId19"/>
+      <p:bold r:id="rId22"/>
+      <p:italic r:id="rId23"/>
+      <p:boldItalic r:id="rId24"/>
     </p:embeddedFont>
     <p:embeddedFont>
       <p:font typeface="FreightMicro Pro Book" panose="02000603020000020004" pitchFamily="2" charset="0"/>
-      <p:regular r:id="rId20"/>
-      <p:italic r:id="rId21"/>
+      <p:regular r:id="rId25"/>
+      <p:italic r:id="rId26"/>
     </p:embeddedFont>
     <p:embeddedFont>
       <p:font typeface="FreightMicro Pro Light" panose="02000603030000020004" pitchFamily="2" charset="0"/>
-      <p:regular r:id="rId22"/>
-      <p:italic r:id="rId23"/>
+      <p:regular r:id="rId27"/>
+      <p:italic r:id="rId28"/>
     </p:embeddedFont>
     <p:embeddedFont>
       <p:font typeface="FreightSans Pro Book" panose="02000606030000020004" pitchFamily="2" charset="0"/>
-      <p:regular r:id="rId24"/>
-      <p:italic r:id="rId25"/>
+      <p:regular r:id="rId29"/>
+      <p:italic r:id="rId30"/>
     </p:embeddedFont>
     <p:embeddedFont>
       <p:font typeface="FreightSans Pro Light" panose="02000606030000020004" pitchFamily="2" charset="0"/>
-      <p:regular r:id="rId26"/>
-      <p:italic r:id="rId27"/>
+      <p:regular r:id="rId31"/>
+      <p:italic r:id="rId32"/>
     </p:embeddedFont>
     <p:embeddedFont>
       <p:font typeface="FreightText Pro Book" panose="02000603060000020004" pitchFamily="2" charset="0"/>
-      <p:regular r:id="rId28"/>
-      <p:italic r:id="rId29"/>
+      <p:regular r:id="rId33"/>
+      <p:italic r:id="rId34"/>
     </p:embeddedFont>
     <p:embeddedFont>
       <p:font typeface="Open Sans" panose="020B0606030504020204" pitchFamily="34" charset="0"/>
-      <p:regular r:id="rId30"/>
-      <p:bold r:id="rId31"/>
-      <p:italic r:id="rId32"/>
-      <p:boldItalic r:id="rId33"/>
+      <p:regular r:id="rId35"/>
+      <p:bold r:id="rId36"/>
+      <p:italic r:id="rId37"/>
+      <p:boldItalic r:id="rId38"/>
     </p:embeddedFont>
     <p:embeddedFont>
       <p:font typeface="Source Code Pro" panose="020B0509030403020204" pitchFamily="49" charset="77"/>
-      <p:regular r:id="rId34"/>
-      <p:bold r:id="rId35"/>
-      <p:italic r:id="rId36"/>
+      <p:regular r:id="rId39"/>
+      <p:bold r:id="rId40"/>
+      <p:italic r:id="rId41"/>
     </p:embeddedFont>
     <p:embeddedFont>
       <p:font typeface="SourceCodePro-Light" panose="020B0509030403020204" pitchFamily="49" charset="77"/>
-      <p:regular r:id="rId37"/>
+      <p:regular r:id="rId42"/>
     </p:embeddedFont>
   </p:embeddedFontLst>
   <p:defaultTextStyle>
@@ -1639,14 +1647,14 @@
           <a:ln/>
           <a:extLst>
             <a:ext uri="{909E8E84-426E-40dd-AFC4-6F175D3DCCD1}">
-              <a14:hiddenFill xmlns:a14="http://schemas.microsoft.com/office/drawing/2010/main" xmlns="">
+              <a14:hiddenFill xmlns="" xmlns:a14="http://schemas.microsoft.com/office/drawing/2010/main">
                 <a:solidFill>
                   <a:srgbClr val="FFFFFF"/>
                 </a:solidFill>
               </a14:hiddenFill>
             </a:ext>
             <a:ext uri="{91240B29-F687-4f45-9708-019B960494DF}">
-              <a14:hiddenLine xmlns:a14="http://schemas.microsoft.com/office/drawing/2010/main" xmlns="" w="9525">
+              <a14:hiddenLine xmlns="" xmlns:a14="http://schemas.microsoft.com/office/drawing/2010/main" w="9525">
                 <a:solidFill>
                   <a:srgbClr val="000000"/>
                 </a:solidFill>
@@ -1814,14 +1822,14 @@
           <a:ln/>
           <a:extLst>
             <a:ext uri="{909E8E84-426E-40dd-AFC4-6F175D3DCCD1}">
-              <a14:hiddenFill xmlns:a14="http://schemas.microsoft.com/office/drawing/2010/main" xmlns="">
+              <a14:hiddenFill xmlns="" xmlns:a14="http://schemas.microsoft.com/office/drawing/2010/main">
                 <a:solidFill>
                   <a:srgbClr val="FFFFFF"/>
                 </a:solidFill>
               </a14:hiddenFill>
             </a:ext>
             <a:ext uri="{91240B29-F687-4f45-9708-019B960494DF}">
-              <a14:hiddenLine xmlns:a14="http://schemas.microsoft.com/office/drawing/2010/main" xmlns="" w="9525">
+              <a14:hiddenLine xmlns="" xmlns:a14="http://schemas.microsoft.com/office/drawing/2010/main" w="9525">
                 <a:solidFill>
                   <a:srgbClr val="000000"/>
                 </a:solidFill>
@@ -1831,7 +1839,7 @@
               </a14:hiddenLine>
             </a:ext>
             <a:ext uri="{FAA26D3D-D897-4be2-8F04-BA451C77F1D7}">
-              <ma14:placeholderFlag xmlns:ma14="http://schemas.microsoft.com/office/mac/drawingml/2011/main" xmlns="" val="1"/>
+              <ma14:placeholderFlag xmlns="" xmlns:ma14="http://schemas.microsoft.com/office/mac/drawingml/2011/main" val="1"/>
             </a:ext>
           </a:extLst>
         </p:spPr>
@@ -2587,7 +2595,7 @@
                 <a:sym typeface="Times New Roman"/>
               </a:rPr>
               <a:pPr algn="r"/>
-              <a:t>4</a:t>
+              <a:t>5</a:t>
             </a:fld>
             <a:endParaRPr lang="en-US" sz="900" dirty="0">
               <a:solidFill>
@@ -3202,7 +3210,7 @@
           </a:ln>
           <a:extLst>
             <a:ext uri="{909E8E84-426E-40dd-AFC4-6F175D3DCCD1}">
-              <a14:hiddenFill xmlns:a14="http://schemas.microsoft.com/office/drawing/2010/main" xmlns="">
+              <a14:hiddenFill xmlns="" xmlns:a14="http://schemas.microsoft.com/office/drawing/2010/main">
                 <a:noFill/>
               </a14:hiddenFill>
             </a:ext>
@@ -3247,14 +3255,14 @@
           </a:ln>
           <a:extLst>
             <a:ext uri="{909E8E84-426E-40dd-AFC4-6F175D3DCCD1}">
-              <a14:hiddenFill xmlns:a14="http://schemas.microsoft.com/office/drawing/2010/main" xmlns="">
+              <a14:hiddenFill xmlns="" xmlns:a14="http://schemas.microsoft.com/office/drawing/2010/main">
                 <a:solidFill>
                   <a:srgbClr val="FFFFFF"/>
                 </a:solidFill>
               </a14:hiddenFill>
             </a:ext>
             <a:ext uri="{91240B29-F687-4f45-9708-019B960494DF}">
-              <a14:hiddenLine xmlns:a14="http://schemas.microsoft.com/office/drawing/2010/main" xmlns="" w="9525">
+              <a14:hiddenLine xmlns="" xmlns:a14="http://schemas.microsoft.com/office/drawing/2010/main" w="9525">
                 <a:solidFill>
                   <a:srgbClr val="000000"/>
                 </a:solidFill>
@@ -3360,14 +3368,14 @@
           </a:ln>
           <a:extLst>
             <a:ext uri="{909E8E84-426E-40dd-AFC4-6F175D3DCCD1}">
-              <a14:hiddenFill xmlns:a14="http://schemas.microsoft.com/office/drawing/2010/main" xmlns="">
+              <a14:hiddenFill xmlns="" xmlns:a14="http://schemas.microsoft.com/office/drawing/2010/main">
                 <a:solidFill>
                   <a:srgbClr val="FFFFFF"/>
                 </a:solidFill>
               </a14:hiddenFill>
             </a:ext>
             <a:ext uri="{91240B29-F687-4f45-9708-019B960494DF}">
-              <a14:hiddenLine xmlns:a14="http://schemas.microsoft.com/office/drawing/2010/main" xmlns="" w="9525">
+              <a14:hiddenLine xmlns="" xmlns:a14="http://schemas.microsoft.com/office/drawing/2010/main" w="9525">
                 <a:solidFill>
                   <a:srgbClr val="000000"/>
                 </a:solidFill>
@@ -3377,7 +3385,7 @@
               </a14:hiddenLine>
             </a:ext>
             <a:ext uri="{FAA26D3D-D897-4be2-8F04-BA451C77F1D7}">
-              <ma14:placeholderFlag xmlns:ma14="http://schemas.microsoft.com/office/mac/drawingml/2011/main" xmlns="" val="1"/>
+              <ma14:placeholderFlag xmlns="" xmlns:ma14="http://schemas.microsoft.com/office/mac/drawingml/2011/main" val="1"/>
             </a:ext>
           </a:extLst>
         </p:spPr>
@@ -3725,14 +3733,14 @@
           </a:ln>
           <a:extLst>
             <a:ext uri="{909E8E84-426E-40dd-AFC4-6F175D3DCCD1}">
-              <a14:hiddenFill xmlns:a14="http://schemas.microsoft.com/office/drawing/2010/main" xmlns="">
+              <a14:hiddenFill xmlns="" xmlns:a14="http://schemas.microsoft.com/office/drawing/2010/main">
                 <a:solidFill>
                   <a:srgbClr val="FFFFFF"/>
                 </a:solidFill>
               </a14:hiddenFill>
             </a:ext>
             <a:ext uri="{91240B29-F687-4f45-9708-019B960494DF}">
-              <a14:hiddenLine xmlns:a14="http://schemas.microsoft.com/office/drawing/2010/main" xmlns="" w="9525">
+              <a14:hiddenLine xmlns="" xmlns:a14="http://schemas.microsoft.com/office/drawing/2010/main" w="9525">
                 <a:solidFill>
                   <a:srgbClr val="000000"/>
                 </a:solidFill>
@@ -3742,7 +3750,7 @@
               </a14:hiddenLine>
             </a:ext>
             <a:ext uri="{FAA26D3D-D897-4be2-8F04-BA451C77F1D7}">
-              <ma14:placeholderFlag xmlns:ma14="http://schemas.microsoft.com/office/mac/drawingml/2011/main" xmlns="" val="1"/>
+              <ma14:placeholderFlag xmlns="" xmlns:ma14="http://schemas.microsoft.com/office/mac/drawingml/2011/main" val="1"/>
             </a:ext>
           </a:extLst>
         </p:spPr>
@@ -5995,14 +6003,14 @@
           </a:ln>
           <a:extLst>
             <a:ext uri="{909E8E84-426E-40dd-AFC4-6F175D3DCCD1}">
-              <a14:hiddenFill xmlns:a14="http://schemas.microsoft.com/office/drawing/2010/main" xmlns="">
+              <a14:hiddenFill xmlns="" xmlns:a14="http://schemas.microsoft.com/office/drawing/2010/main">
                 <a:solidFill>
                   <a:srgbClr val="FFFFFF"/>
                 </a:solidFill>
               </a14:hiddenFill>
             </a:ext>
             <a:ext uri="{91240B29-F687-4f45-9708-019B960494DF}">
-              <a14:hiddenLine xmlns:a14="http://schemas.microsoft.com/office/drawing/2010/main" xmlns="" w="9525">
+              <a14:hiddenLine xmlns="" xmlns:a14="http://schemas.microsoft.com/office/drawing/2010/main" w="9525">
                 <a:solidFill>
                   <a:srgbClr val="000000"/>
                 </a:solidFill>
@@ -6012,7 +6020,7 @@
               </a14:hiddenLine>
             </a:ext>
             <a:ext uri="{FAA26D3D-D897-4be2-8F04-BA451C77F1D7}">
-              <ma14:placeholderFlag xmlns:ma14="http://schemas.microsoft.com/office/mac/drawingml/2011/main" xmlns="" val="1"/>
+              <ma14:placeholderFlag xmlns="" xmlns:ma14="http://schemas.microsoft.com/office/mac/drawingml/2011/main" val="1"/>
             </a:ext>
           </a:extLst>
         </p:spPr>
@@ -6056,14 +6064,14 @@
           </a:ln>
           <a:extLst>
             <a:ext uri="{909E8E84-426E-40dd-AFC4-6F175D3DCCD1}">
-              <a14:hiddenFill xmlns:a14="http://schemas.microsoft.com/office/drawing/2010/main" xmlns="">
+              <a14:hiddenFill xmlns="" xmlns:a14="http://schemas.microsoft.com/office/drawing/2010/main">
                 <a:solidFill>
                   <a:srgbClr val="FFFFFF"/>
                 </a:solidFill>
               </a14:hiddenFill>
             </a:ext>
             <a:ext uri="{91240B29-F687-4f45-9708-019B960494DF}">
-              <a14:hiddenLine xmlns:a14="http://schemas.microsoft.com/office/drawing/2010/main" xmlns="" w="9525">
+              <a14:hiddenLine xmlns="" xmlns:a14="http://schemas.microsoft.com/office/drawing/2010/main" w="9525">
                 <a:solidFill>
                   <a:srgbClr val="000000"/>
                 </a:solidFill>
@@ -6073,7 +6081,7 @@
               </a14:hiddenLine>
             </a:ext>
             <a:ext uri="{FAA26D3D-D897-4be2-8F04-BA451C77F1D7}">
-              <ma14:placeholderFlag xmlns:ma14="http://schemas.microsoft.com/office/mac/drawingml/2011/main" xmlns="" val="1"/>
+              <ma14:placeholderFlag xmlns="" xmlns:ma14="http://schemas.microsoft.com/office/mac/drawingml/2011/main" val="1"/>
             </a:ext>
           </a:extLst>
         </p:spPr>
@@ -6178,7 +6186,7 @@
           </a:ln>
           <a:extLst>
             <a:ext uri="{909E8E84-426E-40dd-AFC4-6F175D3DCCD1}">
-              <a14:hiddenFill xmlns:a14="http://schemas.microsoft.com/office/drawing/2010/main" xmlns="">
+              <a14:hiddenFill xmlns="" xmlns:a14="http://schemas.microsoft.com/office/drawing/2010/main">
                 <a:noFill/>
               </a14:hiddenFill>
             </a:ext>
@@ -6223,14 +6231,14 @@
           </a:ln>
           <a:extLst>
             <a:ext uri="{909E8E84-426E-40dd-AFC4-6F175D3DCCD1}">
-              <a14:hiddenFill xmlns:a14="http://schemas.microsoft.com/office/drawing/2010/main" xmlns="">
+              <a14:hiddenFill xmlns="" xmlns:a14="http://schemas.microsoft.com/office/drawing/2010/main">
                 <a:solidFill>
                   <a:srgbClr val="FFFFFF"/>
                 </a:solidFill>
               </a14:hiddenFill>
             </a:ext>
             <a:ext uri="{91240B29-F687-4f45-9708-019B960494DF}">
-              <a14:hiddenLine xmlns:a14="http://schemas.microsoft.com/office/drawing/2010/main" xmlns="" w="9525">
+              <a14:hiddenLine xmlns="" xmlns:a14="http://schemas.microsoft.com/office/drawing/2010/main" w="9525">
                 <a:solidFill>
                   <a:srgbClr val="000000"/>
                 </a:solidFill>
@@ -6270,14 +6278,14 @@
           </a:ln>
           <a:extLst>
             <a:ext uri="{909E8E84-426E-40dd-AFC4-6F175D3DCCD1}">
-              <a14:hiddenFill xmlns:a14="http://schemas.microsoft.com/office/drawing/2010/main" xmlns="">
+              <a14:hiddenFill xmlns="" xmlns:a14="http://schemas.microsoft.com/office/drawing/2010/main">
                 <a:solidFill>
                   <a:srgbClr val="FFFFFF"/>
                 </a:solidFill>
               </a14:hiddenFill>
             </a:ext>
             <a:ext uri="{91240B29-F687-4f45-9708-019B960494DF}">
-              <a14:hiddenLine xmlns:a14="http://schemas.microsoft.com/office/drawing/2010/main" xmlns="" w="9525">
+              <a14:hiddenLine xmlns="" xmlns:a14="http://schemas.microsoft.com/office/drawing/2010/main" w="9525">
                 <a:solidFill>
                   <a:srgbClr val="000000"/>
                 </a:solidFill>
@@ -6287,7 +6295,7 @@
               </a14:hiddenLine>
             </a:ext>
             <a:ext uri="{FAA26D3D-D897-4be2-8F04-BA451C77F1D7}">
-              <ma14:placeholderFlag xmlns:ma14="http://schemas.microsoft.com/office/mac/drawingml/2011/main" xmlns="" val="1"/>
+              <ma14:placeholderFlag xmlns="" xmlns:ma14="http://schemas.microsoft.com/office/mac/drawingml/2011/main" val="1"/>
             </a:ext>
           </a:extLst>
         </p:spPr>
@@ -7086,6 +7094,210 @@
             <p:ph type="title"/>
           </p:nvPr>
         </p:nvSpPr>
+        <p:spPr/>
+        <p:txBody>
+          <a:bodyPr/>
+          <a:lstStyle/>
+          <a:p>
+            <a:r>
+              <a:rPr lang="en-US" dirty="0"/>
+              <a:t>Nest iteration</a:t>
+            </a:r>
+          </a:p>
+        </p:txBody>
+      </p:sp>
+      <p:sp>
+        <p:nvSpPr>
+          <p:cNvPr id="3" name="Content Placeholder 2">
+            <a:extLst>
+              <a:ext uri="{FF2B5EF4-FFF2-40B4-BE49-F238E27FC236}">
+                <a16:creationId xmlns:a16="http://schemas.microsoft.com/office/drawing/2014/main" id="{4809B95D-1072-A04D-28C3-F946315D9B03}"/>
+              </a:ext>
+            </a:extLst>
+          </p:cNvPr>
+          <p:cNvSpPr>
+            <a:spLocks noGrp="1"/>
+          </p:cNvSpPr>
+          <p:nvPr>
+            <p:ph idx="1"/>
+          </p:nvPr>
+        </p:nvSpPr>
+        <p:spPr/>
+        <p:txBody>
+          <a:bodyPr/>
+          <a:lstStyle/>
+          <a:p>
+            <a:endParaRPr lang="en-US" dirty="0"/>
+          </a:p>
+        </p:txBody>
+      </p:sp>
+      <p:sp>
+        <p:nvSpPr>
+          <p:cNvPr id="241" name="Google Shape;241;p28"/>
+          <p:cNvSpPr/>
+          <p:nvPr/>
+        </p:nvSpPr>
+        <p:spPr>
+          <a:xfrm>
+            <a:off x="2590800" y="1774042"/>
+            <a:ext cx="6324600" cy="1323439"/>
+          </a:xfrm>
+          <a:prstGeom prst="rect">
+            <a:avLst/>
+          </a:prstGeom>
+          <a:noFill/>
+          <a:ln w="9525" cap="flat" cmpd="sng">
+            <a:solidFill>
+              <a:schemeClr val="accent1"/>
+            </a:solidFill>
+            <a:prstDash val="solid"/>
+            <a:round/>
+            <a:headEnd type="none" w="sm" len="sm"/>
+            <a:tailEnd type="none" w="sm" len="sm"/>
+          </a:ln>
+        </p:spPr>
+        <p:txBody>
+          <a:bodyPr spcFirstLastPara="1" wrap="square" lIns="91425" tIns="45700" rIns="91425" bIns="45700" anchor="t" anchorCtr="0">
+            <a:noAutofit/>
+          </a:bodyPr>
+          <a:lstStyle/>
+          <a:p>
+            <a:r>
+              <a:rPr lang="en-US" sz="2000" dirty="0">
+                <a:solidFill>
+                  <a:schemeClr val="dk1"/>
+                </a:solidFill>
+                <a:latin typeface="Source Code Pro" panose="020B0509030403020204" pitchFamily="49" charset="0"/>
+                <a:ea typeface="Source Code Pro" panose="020B0509030403020204" pitchFamily="49" charset="0"/>
+                <a:cs typeface="Open Sans" panose="020B0606030504020204" pitchFamily="34" charset="0"/>
+                <a:sym typeface="Courier"/>
+              </a:rPr>
+              <a:t>def </a:t>
+            </a:r>
+            <a:r>
+              <a:rPr lang="en-US" sz="2000" dirty="0" err="1">
+                <a:solidFill>
+                  <a:schemeClr val="dk1"/>
+                </a:solidFill>
+                <a:latin typeface="Source Code Pro" panose="020B0509030403020204" pitchFamily="49" charset="0"/>
+                <a:ea typeface="Source Code Pro" panose="020B0509030403020204" pitchFamily="49" charset="0"/>
+                <a:cs typeface="Open Sans" panose="020B0606030504020204" pitchFamily="34" charset="0"/>
+                <a:sym typeface="Courier"/>
+              </a:rPr>
+              <a:t>all_pairs</a:t>
+            </a:r>
+            <a:r>
+              <a:rPr lang="en-US" sz="2000" dirty="0">
+                <a:solidFill>
+                  <a:schemeClr val="dk1"/>
+                </a:solidFill>
+                <a:latin typeface="Source Code Pro" panose="020B0509030403020204" pitchFamily="49" charset="0"/>
+                <a:ea typeface="Source Code Pro" panose="020B0509030403020204" pitchFamily="49" charset="0"/>
+                <a:cs typeface="Open Sans" panose="020B0606030504020204" pitchFamily="34" charset="0"/>
+                <a:sym typeface="Courier"/>
+              </a:rPr>
+              <a:t>(x):</a:t>
+            </a:r>
+            <a:endParaRPr dirty="0">
+              <a:latin typeface="Source Code Pro" panose="020B0509030403020204" pitchFamily="49" charset="0"/>
+              <a:ea typeface="Source Code Pro" panose="020B0509030403020204" pitchFamily="49" charset="0"/>
+              <a:cs typeface="Open Sans" panose="020B0606030504020204" pitchFamily="34" charset="0"/>
+            </a:endParaRPr>
+          </a:p>
+          <a:p>
+            <a:r>
+              <a:rPr lang="en-US" sz="2000" dirty="0">
+                <a:solidFill>
+                  <a:schemeClr val="dk1"/>
+                </a:solidFill>
+                <a:latin typeface="Source Code Pro" panose="020B0509030403020204" pitchFamily="49" charset="0"/>
+                <a:ea typeface="Source Code Pro" panose="020B0509030403020204" pitchFamily="49" charset="0"/>
+                <a:cs typeface="Open Sans" panose="020B0606030504020204" pitchFamily="34" charset="0"/>
+                <a:sym typeface="Courier"/>
+              </a:rPr>
+              <a:t>    for item1 in x:</a:t>
+            </a:r>
+            <a:endParaRPr dirty="0">
+              <a:latin typeface="Source Code Pro" panose="020B0509030403020204" pitchFamily="49" charset="0"/>
+              <a:ea typeface="Source Code Pro" panose="020B0509030403020204" pitchFamily="49" charset="0"/>
+              <a:cs typeface="Open Sans" panose="020B0606030504020204" pitchFamily="34" charset="0"/>
+            </a:endParaRPr>
+          </a:p>
+          <a:p>
+            <a:r>
+              <a:rPr lang="en-US" sz="2000" dirty="0">
+                <a:solidFill>
+                  <a:schemeClr val="dk1"/>
+                </a:solidFill>
+                <a:latin typeface="Source Code Pro" panose="020B0509030403020204" pitchFamily="49" charset="0"/>
+                <a:ea typeface="Source Code Pro" panose="020B0509030403020204" pitchFamily="49" charset="0"/>
+                <a:cs typeface="Open Sans" panose="020B0606030504020204" pitchFamily="34" charset="0"/>
+                <a:sym typeface="Courier"/>
+              </a:rPr>
+              <a:t>        for item2 in x:</a:t>
+            </a:r>
+            <a:endParaRPr dirty="0">
+              <a:latin typeface="Source Code Pro" panose="020B0509030403020204" pitchFamily="49" charset="0"/>
+              <a:ea typeface="Source Code Pro" panose="020B0509030403020204" pitchFamily="49" charset="0"/>
+              <a:cs typeface="Open Sans" panose="020B0606030504020204" pitchFamily="34" charset="0"/>
+            </a:endParaRPr>
+          </a:p>
+          <a:p>
+            <a:r>
+              <a:rPr lang="en-US" sz="2000" dirty="0">
+                <a:solidFill>
+                  <a:schemeClr val="dk1"/>
+                </a:solidFill>
+                <a:latin typeface="Source Code Pro" panose="020B0509030403020204" pitchFamily="49" charset="0"/>
+                <a:ea typeface="Source Code Pro" panose="020B0509030403020204" pitchFamily="49" charset="0"/>
+                <a:cs typeface="Open Sans" panose="020B0606030504020204" pitchFamily="34" charset="0"/>
+                <a:sym typeface="Courier"/>
+              </a:rPr>
+              <a:t>            yield(item1, item2)</a:t>
+            </a:r>
+            <a:endParaRPr dirty="0">
+              <a:latin typeface="Source Code Pro" panose="020B0509030403020204" pitchFamily="49" charset="0"/>
+              <a:ea typeface="Source Code Pro" panose="020B0509030403020204" pitchFamily="49" charset="0"/>
+              <a:cs typeface="Open Sans" panose="020B0606030504020204" pitchFamily="34" charset="0"/>
+            </a:endParaRPr>
+          </a:p>
+        </p:txBody>
+      </p:sp>
+    </p:spTree>
+  </p:cSld>
+  <p:clrMapOvr>
+    <a:masterClrMapping/>
+  </p:clrMapOvr>
+</p:sld>
+</file>
+
+<file path=ppt/slides/slide11.xml><?xml version="1.0" encoding="utf-8"?>
+<p:sld xmlns:a="http://schemas.openxmlformats.org/drawingml/2006/main" xmlns:r="http://schemas.openxmlformats.org/officeDocument/2006/relationships" xmlns:p="http://schemas.openxmlformats.org/presentationml/2006/main">
+  <p:cSld>
+    <p:spTree>
+      <p:nvGrpSpPr>
+        <p:cNvPr id="1" name="Shape 236"/>
+        <p:cNvGrpSpPr/>
+        <p:nvPr/>
+      </p:nvGrpSpPr>
+      <p:grpSpPr>
+        <a:xfrm>
+          <a:off x="0" y="0"/>
+          <a:ext cx="0" cy="0"/>
+          <a:chOff x="0" y="0"/>
+          <a:chExt cx="0" cy="0"/>
+        </a:xfrm>
+      </p:grpSpPr>
+      <p:sp>
+        <p:nvSpPr>
+          <p:cNvPr id="237" name="Google Shape;237;p28"/>
+          <p:cNvSpPr txBox="1">
+            <a:spLocks noGrp="1"/>
+          </p:cNvSpPr>
+          <p:nvPr>
+            <p:ph type="title"/>
+          </p:nvPr>
+        </p:nvSpPr>
         <p:spPr>
           <a:xfrm>
             <a:off x="489857" y="228600"/>
@@ -7242,7 +7454,7 @@
 </p:sld>
 </file>
 
-<file path=ppt/slides/slide11.xml><?xml version="1.0" encoding="utf-8"?>
+<file path=ppt/slides/slide12.xml><?xml version="1.0" encoding="utf-8"?>
 <p:sld xmlns:a="http://schemas.openxmlformats.org/drawingml/2006/main" xmlns:r="http://schemas.openxmlformats.org/officeDocument/2006/relationships" xmlns:p="http://schemas.openxmlformats.org/presentationml/2006/main">
   <p:cSld>
     <p:spTree>
@@ -7396,7 +7608,7 @@
 </p:sld>
 </file>
 
-<file path=ppt/slides/slide12.xml><?xml version="1.0" encoding="utf-8"?>
+<file path=ppt/slides/slide13.xml><?xml version="1.0" encoding="utf-8"?>
 <p:sld xmlns:a="http://schemas.openxmlformats.org/drawingml/2006/main" xmlns:r="http://schemas.openxmlformats.org/officeDocument/2006/relationships" xmlns:p="http://schemas.openxmlformats.org/presentationml/2006/main">
   <p:cSld>
     <p:spTree>
@@ -7668,7 +7880,7 @@
 </p:sld>
 </file>
 
-<file path=ppt/slides/slide13.xml><?xml version="1.0" encoding="utf-8"?>
+<file path=ppt/slides/slide14.xml><?xml version="1.0" encoding="utf-8"?>
 <p:sld xmlns:a="http://schemas.openxmlformats.org/drawingml/2006/main" xmlns:r="http://schemas.openxmlformats.org/officeDocument/2006/relationships" xmlns:p="http://schemas.openxmlformats.org/presentationml/2006/main">
   <p:cSld>
     <p:spTree>
@@ -7808,7 +8020,7 @@
 </p:sld>
 </file>
 
-<file path=ppt/slides/slide14.xml><?xml version="1.0" encoding="utf-8"?>
+<file path=ppt/slides/slide15.xml><?xml version="1.0" encoding="utf-8"?>
 <p:sld xmlns:a="http://schemas.openxmlformats.org/drawingml/2006/main" xmlns:r="http://schemas.openxmlformats.org/officeDocument/2006/relationships" xmlns:p="http://schemas.openxmlformats.org/presentationml/2006/main">
   <p:cSld>
     <p:spTree>
@@ -7942,6 +8154,131 @@
 </file>
 
 <file path=ppt/slides/slide2.xml><?xml version="1.0" encoding="utf-8"?>
+<p:sld xmlns:a="http://schemas.openxmlformats.org/drawingml/2006/main" xmlns:r="http://schemas.openxmlformats.org/officeDocument/2006/relationships" xmlns:p="http://schemas.openxmlformats.org/presentationml/2006/main">
+  <p:cSld>
+    <p:spTree>
+      <p:nvGrpSpPr>
+        <p:cNvPr id="1" name=""/>
+        <p:cNvGrpSpPr/>
+        <p:nvPr/>
+      </p:nvGrpSpPr>
+      <p:grpSpPr>
+        <a:xfrm>
+          <a:off x="0" y="0"/>
+          <a:ext cx="0" cy="0"/>
+          <a:chOff x="0" y="0"/>
+          <a:chExt cx="0" cy="0"/>
+        </a:xfrm>
+      </p:grpSpPr>
+      <p:sp>
+        <p:nvSpPr>
+          <p:cNvPr id="2" name="Title 1">
+            <a:extLst>
+              <a:ext uri="{FF2B5EF4-FFF2-40B4-BE49-F238E27FC236}">
+                <a16:creationId xmlns:a16="http://schemas.microsoft.com/office/drawing/2014/main" id="{4C3575D3-8338-0B80-0039-E61AAF83E403}"/>
+              </a:ext>
+            </a:extLst>
+          </p:cNvPr>
+          <p:cNvSpPr>
+            <a:spLocks noGrp="1"/>
+          </p:cNvSpPr>
+          <p:nvPr>
+            <p:ph type="title"/>
+          </p:nvPr>
+        </p:nvSpPr>
+        <p:spPr/>
+        <p:txBody>
+          <a:bodyPr/>
+          <a:lstStyle/>
+          <a:p>
+            <a:r>
+              <a:rPr lang="en-US" dirty="0"/>
+              <a:t>Announcements</a:t>
+            </a:r>
+          </a:p>
+        </p:txBody>
+      </p:sp>
+      <p:sp>
+        <p:nvSpPr>
+          <p:cNvPr id="3" name="Content Placeholder 2">
+            <a:extLst>
+              <a:ext uri="{FF2B5EF4-FFF2-40B4-BE49-F238E27FC236}">
+                <a16:creationId xmlns:a16="http://schemas.microsoft.com/office/drawing/2014/main" id="{8F6A772A-4D78-4119-887F-79C16CDF6A52}"/>
+              </a:ext>
+            </a:extLst>
+          </p:cNvPr>
+          <p:cNvSpPr>
+            <a:spLocks noGrp="1"/>
+          </p:cNvSpPr>
+          <p:nvPr>
+            <p:ph idx="1"/>
+          </p:nvPr>
+        </p:nvSpPr>
+        <p:spPr/>
+        <p:txBody>
+          <a:bodyPr/>
+          <a:lstStyle/>
+          <a:p>
+            <a:r>
+              <a:rPr lang="en-US" dirty="0"/>
+              <a:t> Ants Project out later today!</a:t>
+            </a:r>
+          </a:p>
+          <a:p>
+            <a:pPr lvl="1"/>
+            <a:r>
+              <a:rPr lang="en-US" dirty="0"/>
+              <a:t>  Last project, use partners!</a:t>
+            </a:r>
+          </a:p>
+          <a:p>
+            <a:r>
+              <a:rPr lang="en-US" dirty="0"/>
+              <a:t> Cool YouTube Video</a:t>
+            </a:r>
+          </a:p>
+          <a:p>
+            <a:pPr lvl="1"/>
+            <a:r>
+              <a:rPr lang="en-US" dirty="0"/>
+              <a:t> </a:t>
+            </a:r>
+            <a:r>
+              <a:rPr lang="en-US" dirty="0">
+                <a:hlinkClick r:id="rId2"/>
+              </a:rPr>
+              <a:t>https://www.youtube.com/watch?v=nmgFG7PUHfo</a:t>
+            </a:r>
+            <a:endParaRPr lang="en-US" dirty="0"/>
+          </a:p>
+          <a:p>
+            <a:pPr lvl="1"/>
+            <a:r>
+              <a:rPr lang="en-US" dirty="0"/>
+              <a:t> Signal Processing / History / </a:t>
+            </a:r>
+            <a:r>
+              <a:rPr lang="en-US"/>
+              <a:t>Algorithmic Complexity</a:t>
+            </a:r>
+            <a:endParaRPr lang="en-US" dirty="0"/>
+          </a:p>
+        </p:txBody>
+      </p:sp>
+    </p:spTree>
+    <p:extLst>
+      <p:ext uri="{BB962C8B-B14F-4D97-AF65-F5344CB8AC3E}">
+        <p14:creationId xmlns:p14="http://schemas.microsoft.com/office/powerpoint/2010/main" val="1222708076"/>
+      </p:ext>
+    </p:extLst>
+  </p:cSld>
+  <p:clrMapOvr>
+    <a:masterClrMapping/>
+  </p:clrMapOvr>
+</p:sld>
+</file>
+
+<file path=ppt/slides/slide3.xml><?xml version="1.0" encoding="utf-8"?>
 <p:sld xmlns:a="http://schemas.openxmlformats.org/drawingml/2006/main" xmlns:r="http://schemas.openxmlformats.org/officeDocument/2006/relationships" xmlns:p="http://schemas.openxmlformats.org/presentationml/2006/main">
   <p:cSld>
     <p:spTree>
@@ -8300,7 +8637,7 @@
 </p:sld>
 </file>
 
-<file path=ppt/slides/slide3.xml><?xml version="1.0" encoding="utf-8"?>
+<file path=ppt/slides/slide4.xml><?xml version="1.0" encoding="utf-8"?>
 <p:sld xmlns:a="http://schemas.openxmlformats.org/drawingml/2006/main" xmlns:r="http://schemas.openxmlformats.org/officeDocument/2006/relationships" xmlns:p="http://schemas.openxmlformats.org/presentationml/2006/main">
   <p:cSld>
     <p:spTree>
@@ -8497,7 +8834,7 @@
 </p:sld>
 </file>
 
-<file path=ppt/slides/slide4.xml><?xml version="1.0" encoding="utf-8"?>
+<file path=ppt/slides/slide5.xml><?xml version="1.0" encoding="utf-8"?>
 <p:sld xmlns:a="http://schemas.openxmlformats.org/drawingml/2006/main" xmlns:r="http://schemas.openxmlformats.org/officeDocument/2006/relationships" xmlns:p="http://schemas.openxmlformats.org/presentationml/2006/main">
   <p:cSld>
     <p:spTree>
@@ -8714,7 +9051,7 @@
 </p:sld>
 </file>
 
-<file path=ppt/slides/slide5.xml><?xml version="1.0" encoding="utf-8"?>
+<file path=ppt/slides/slide6.xml><?xml version="1.0" encoding="utf-8"?>
 <p:sld xmlns:a="http://schemas.openxmlformats.org/drawingml/2006/main" xmlns:r="http://schemas.openxmlformats.org/officeDocument/2006/relationships" xmlns:p="http://schemas.openxmlformats.org/presentationml/2006/main">
   <p:cSld>
     <p:spTree>
@@ -8811,7 +9148,7 @@
 </p:sld>
 </file>
 
-<file path=ppt/slides/slide6.xml><?xml version="1.0" encoding="utf-8"?>
+<file path=ppt/slides/slide7.xml><?xml version="1.0" encoding="utf-8"?>
 <p:sld xmlns:a="http://schemas.openxmlformats.org/drawingml/2006/main" xmlns:r="http://schemas.openxmlformats.org/officeDocument/2006/relationships" xmlns:p="http://schemas.openxmlformats.org/presentationml/2006/main">
   <p:cSld>
     <p:spTree>
@@ -8965,7 +9302,7 @@
 </p:sld>
 </file>
 
-<file path=ppt/slides/slide7.xml><?xml version="1.0" encoding="utf-8"?>
+<file path=ppt/slides/slide8.xml><?xml version="1.0" encoding="utf-8"?>
 <p:sld xmlns:a="http://schemas.openxmlformats.org/drawingml/2006/main" xmlns:r="http://schemas.openxmlformats.org/officeDocument/2006/relationships" xmlns:p="http://schemas.openxmlformats.org/presentationml/2006/main">
   <p:cSld>
     <p:spTree>
@@ -9201,7 +9538,7 @@
 </p:sld>
 </file>
 
-<file path=ppt/slides/slide8.xml><?xml version="1.0" encoding="utf-8"?>
+<file path=ppt/slides/slide9.xml><?xml version="1.0" encoding="utf-8"?>
 <p:sld xmlns:a="http://schemas.openxmlformats.org/drawingml/2006/main" xmlns:r="http://schemas.openxmlformats.org/officeDocument/2006/relationships" xmlns:p="http://schemas.openxmlformats.org/presentationml/2006/main">
   <p:cSld>
     <p:spTree>
@@ -9535,210 +9872,6 @@
             <a:endParaRPr dirty="0">
               <a:latin typeface="Source Code Pro" panose="020B0509030403020204" pitchFamily="49" charset="77"/>
               <a:ea typeface="Open Sans" panose="020B0606030504020204" pitchFamily="34" charset="0"/>
-              <a:cs typeface="Open Sans" panose="020B0606030504020204" pitchFamily="34" charset="0"/>
-            </a:endParaRPr>
-          </a:p>
-        </p:txBody>
-      </p:sp>
-    </p:spTree>
-  </p:cSld>
-  <p:clrMapOvr>
-    <a:masterClrMapping/>
-  </p:clrMapOvr>
-</p:sld>
-</file>
-
-<file path=ppt/slides/slide9.xml><?xml version="1.0" encoding="utf-8"?>
-<p:sld xmlns:a="http://schemas.openxmlformats.org/drawingml/2006/main" xmlns:r="http://schemas.openxmlformats.org/officeDocument/2006/relationships" xmlns:p="http://schemas.openxmlformats.org/presentationml/2006/main">
-  <p:cSld>
-    <p:spTree>
-      <p:nvGrpSpPr>
-        <p:cNvPr id="1" name="Shape 236"/>
-        <p:cNvGrpSpPr/>
-        <p:nvPr/>
-      </p:nvGrpSpPr>
-      <p:grpSpPr>
-        <a:xfrm>
-          <a:off x="0" y="0"/>
-          <a:ext cx="0" cy="0"/>
-          <a:chOff x="0" y="0"/>
-          <a:chExt cx="0" cy="0"/>
-        </a:xfrm>
-      </p:grpSpPr>
-      <p:sp>
-        <p:nvSpPr>
-          <p:cNvPr id="237" name="Google Shape;237;p28"/>
-          <p:cNvSpPr txBox="1">
-            <a:spLocks noGrp="1"/>
-          </p:cNvSpPr>
-          <p:nvPr>
-            <p:ph type="title"/>
-          </p:nvPr>
-        </p:nvSpPr>
-        <p:spPr/>
-        <p:txBody>
-          <a:bodyPr/>
-          <a:lstStyle/>
-          <a:p>
-            <a:r>
-              <a:rPr lang="en-US" dirty="0"/>
-              <a:t>Nest iteration</a:t>
-            </a:r>
-          </a:p>
-        </p:txBody>
-      </p:sp>
-      <p:sp>
-        <p:nvSpPr>
-          <p:cNvPr id="3" name="Content Placeholder 2">
-            <a:extLst>
-              <a:ext uri="{FF2B5EF4-FFF2-40B4-BE49-F238E27FC236}">
-                <a16:creationId xmlns:a16="http://schemas.microsoft.com/office/drawing/2014/main" id="{4809B95D-1072-A04D-28C3-F946315D9B03}"/>
-              </a:ext>
-            </a:extLst>
-          </p:cNvPr>
-          <p:cNvSpPr>
-            <a:spLocks noGrp="1"/>
-          </p:cNvSpPr>
-          <p:nvPr>
-            <p:ph idx="1"/>
-          </p:nvPr>
-        </p:nvSpPr>
-        <p:spPr/>
-        <p:txBody>
-          <a:bodyPr/>
-          <a:lstStyle/>
-          <a:p>
-            <a:endParaRPr lang="en-US" dirty="0"/>
-          </a:p>
-        </p:txBody>
-      </p:sp>
-      <p:sp>
-        <p:nvSpPr>
-          <p:cNvPr id="241" name="Google Shape;241;p28"/>
-          <p:cNvSpPr/>
-          <p:nvPr/>
-        </p:nvSpPr>
-        <p:spPr>
-          <a:xfrm>
-            <a:off x="2590800" y="1774042"/>
-            <a:ext cx="6324600" cy="1323439"/>
-          </a:xfrm>
-          <a:prstGeom prst="rect">
-            <a:avLst/>
-          </a:prstGeom>
-          <a:noFill/>
-          <a:ln w="9525" cap="flat" cmpd="sng">
-            <a:solidFill>
-              <a:schemeClr val="accent1"/>
-            </a:solidFill>
-            <a:prstDash val="solid"/>
-            <a:round/>
-            <a:headEnd type="none" w="sm" len="sm"/>
-            <a:tailEnd type="none" w="sm" len="sm"/>
-          </a:ln>
-        </p:spPr>
-        <p:txBody>
-          <a:bodyPr spcFirstLastPara="1" wrap="square" lIns="91425" tIns="45700" rIns="91425" bIns="45700" anchor="t" anchorCtr="0">
-            <a:noAutofit/>
-          </a:bodyPr>
-          <a:lstStyle/>
-          <a:p>
-            <a:r>
-              <a:rPr lang="en-US" sz="2000" dirty="0">
-                <a:solidFill>
-                  <a:schemeClr val="dk1"/>
-                </a:solidFill>
-                <a:latin typeface="Source Code Pro" panose="020B0509030403020204" pitchFamily="49" charset="0"/>
-                <a:ea typeface="Source Code Pro" panose="020B0509030403020204" pitchFamily="49" charset="0"/>
-                <a:cs typeface="Open Sans" panose="020B0606030504020204" pitchFamily="34" charset="0"/>
-                <a:sym typeface="Courier"/>
-              </a:rPr>
-              <a:t>def </a:t>
-            </a:r>
-            <a:r>
-              <a:rPr lang="en-US" sz="2000" dirty="0" err="1">
-                <a:solidFill>
-                  <a:schemeClr val="dk1"/>
-                </a:solidFill>
-                <a:latin typeface="Source Code Pro" panose="020B0509030403020204" pitchFamily="49" charset="0"/>
-                <a:ea typeface="Source Code Pro" panose="020B0509030403020204" pitchFamily="49" charset="0"/>
-                <a:cs typeface="Open Sans" panose="020B0606030504020204" pitchFamily="34" charset="0"/>
-                <a:sym typeface="Courier"/>
-              </a:rPr>
-              <a:t>all_pairs</a:t>
-            </a:r>
-            <a:r>
-              <a:rPr lang="en-US" sz="2000" dirty="0">
-                <a:solidFill>
-                  <a:schemeClr val="dk1"/>
-                </a:solidFill>
-                <a:latin typeface="Source Code Pro" panose="020B0509030403020204" pitchFamily="49" charset="0"/>
-                <a:ea typeface="Source Code Pro" panose="020B0509030403020204" pitchFamily="49" charset="0"/>
-                <a:cs typeface="Open Sans" panose="020B0606030504020204" pitchFamily="34" charset="0"/>
-                <a:sym typeface="Courier"/>
-              </a:rPr>
-              <a:t>(x):</a:t>
-            </a:r>
-            <a:endParaRPr dirty="0">
-              <a:latin typeface="Source Code Pro" panose="020B0509030403020204" pitchFamily="49" charset="0"/>
-              <a:ea typeface="Source Code Pro" panose="020B0509030403020204" pitchFamily="49" charset="0"/>
-              <a:cs typeface="Open Sans" panose="020B0606030504020204" pitchFamily="34" charset="0"/>
-            </a:endParaRPr>
-          </a:p>
-          <a:p>
-            <a:r>
-              <a:rPr lang="en-US" sz="2000" dirty="0">
-                <a:solidFill>
-                  <a:schemeClr val="dk1"/>
-                </a:solidFill>
-                <a:latin typeface="Source Code Pro" panose="020B0509030403020204" pitchFamily="49" charset="0"/>
-                <a:ea typeface="Source Code Pro" panose="020B0509030403020204" pitchFamily="49" charset="0"/>
-                <a:cs typeface="Open Sans" panose="020B0606030504020204" pitchFamily="34" charset="0"/>
-                <a:sym typeface="Courier"/>
-              </a:rPr>
-              <a:t>    for item1 in x:</a:t>
-            </a:r>
-            <a:endParaRPr dirty="0">
-              <a:latin typeface="Source Code Pro" panose="020B0509030403020204" pitchFamily="49" charset="0"/>
-              <a:ea typeface="Source Code Pro" panose="020B0509030403020204" pitchFamily="49" charset="0"/>
-              <a:cs typeface="Open Sans" panose="020B0606030504020204" pitchFamily="34" charset="0"/>
-            </a:endParaRPr>
-          </a:p>
-          <a:p>
-            <a:r>
-              <a:rPr lang="en-US" sz="2000" dirty="0">
-                <a:solidFill>
-                  <a:schemeClr val="dk1"/>
-                </a:solidFill>
-                <a:latin typeface="Source Code Pro" panose="020B0509030403020204" pitchFamily="49" charset="0"/>
-                <a:ea typeface="Source Code Pro" panose="020B0509030403020204" pitchFamily="49" charset="0"/>
-                <a:cs typeface="Open Sans" panose="020B0606030504020204" pitchFamily="34" charset="0"/>
-                <a:sym typeface="Courier"/>
-              </a:rPr>
-              <a:t>        for item2 in x:</a:t>
-            </a:r>
-            <a:endParaRPr dirty="0">
-              <a:latin typeface="Source Code Pro" panose="020B0509030403020204" pitchFamily="49" charset="0"/>
-              <a:ea typeface="Source Code Pro" panose="020B0509030403020204" pitchFamily="49" charset="0"/>
-              <a:cs typeface="Open Sans" panose="020B0606030504020204" pitchFamily="34" charset="0"/>
-            </a:endParaRPr>
-          </a:p>
-          <a:p>
-            <a:r>
-              <a:rPr lang="en-US" sz="2000" dirty="0">
-                <a:solidFill>
-                  <a:schemeClr val="dk1"/>
-                </a:solidFill>
-                <a:latin typeface="Source Code Pro" panose="020B0509030403020204" pitchFamily="49" charset="0"/>
-                <a:ea typeface="Source Code Pro" panose="020B0509030403020204" pitchFamily="49" charset="0"/>
-                <a:cs typeface="Open Sans" panose="020B0606030504020204" pitchFamily="34" charset="0"/>
-                <a:sym typeface="Courier"/>
-              </a:rPr>
-              <a:t>            yield(item1, item2)</a:t>
-            </a:r>
-            <a:endParaRPr dirty="0">
-              <a:latin typeface="Source Code Pro" panose="020B0509030403020204" pitchFamily="49" charset="0"/>
-              <a:ea typeface="Source Code Pro" panose="020B0509030403020204" pitchFamily="49" charset="0"/>
               <a:cs typeface="Open Sans" panose="020B0606030504020204" pitchFamily="34" charset="0"/>
             </a:endParaRPr>
           </a:p>

</xml_diff>